<commit_message>
updated the project description and readme
</commit_message>
<xml_diff>
--- a/project_explanation.pptx
+++ b/project_explanation.pptx
@@ -7,6 +7,10 @@
   <p:sldIdLst>
     <p:sldId id="256" r:id="rId2"/>
     <p:sldId id="257" r:id="rId3"/>
+    <p:sldId id="258" r:id="rId4"/>
+    <p:sldId id="259" r:id="rId5"/>
+    <p:sldId id="260" r:id="rId6"/>
+    <p:sldId id="261" r:id="rId7"/>
   </p:sldIdLst>
   <p:sldSz cx="12192000" cy="6858000"/>
   <p:notesSz cx="6858000" cy="9144000"/>
@@ -3465,7 +3469,9 @@
         </p:nvSpPr>
         <p:spPr/>
         <p:txBody>
-          <a:bodyPr/>
+          <a:bodyPr>
+            <a:normAutofit fontScale="92500" lnSpcReduction="20000"/>
+          </a:bodyPr>
           <a:lstStyle/>
           <a:p>
             <a:pPr marL="0" indent="0">
@@ -3480,9 +3486,15 @@
             <a:pPr marL="0" indent="0">
               <a:buNone/>
             </a:pPr>
+            <a:endParaRPr lang="en-US" dirty="0"/>
+          </a:p>
+          <a:p>
+            <a:pPr marL="0" indent="0">
+              <a:buNone/>
+            </a:pPr>
             <a:r>
               <a:rPr lang="en-US" dirty="0"/>
-              <a:t>It is written with the following technologies:</a:t>
+              <a:t>Technologies and concepts used:</a:t>
             </a:r>
           </a:p>
           <a:p>
@@ -3505,22 +3517,42 @@
           </a:p>
           <a:p>
             <a:r>
-              <a:rPr lang="en-US"/>
+              <a:rPr lang="en-US" dirty="0"/>
               <a:t>Apache 2.x</a:t>
             </a:r>
-            <a:endParaRPr lang="en-US" dirty="0"/>
-          </a:p>
-          <a:p>
-            <a:pPr marL="0" indent="0">
-              <a:buNone/>
-            </a:pPr>
+          </a:p>
+          <a:p>
             <a:r>
               <a:rPr lang="en-US" dirty="0"/>
-              <a:t>The following features have been implemented:</a:t>
-            </a:r>
-          </a:p>
-          <a:p>
-            <a:endParaRPr lang="en-US" dirty="0"/>
+              <a:t>ECMA Script 2015 (JS)</a:t>
+            </a:r>
+          </a:p>
+          <a:p>
+            <a:pPr lvl="1"/>
+            <a:r>
+              <a:rPr lang="en-US" dirty="0"/>
+              <a:t>AJAX with the “vanilla” </a:t>
+            </a:r>
+            <a:r>
+              <a:rPr lang="en-US" dirty="0" err="1"/>
+              <a:t>XMLHttpRequest</a:t>
+            </a:r>
+            <a:r>
+              <a:rPr lang="en-US" dirty="0"/>
+              <a:t> object.</a:t>
+            </a:r>
+          </a:p>
+          <a:p>
+            <a:r>
+              <a:rPr lang="en-US" dirty="0"/>
+              <a:t>MVC design pattern</a:t>
+            </a:r>
+          </a:p>
+          <a:p>
+            <a:r>
+              <a:rPr lang="en-US" dirty="0"/>
+              <a:t>Rc4 encryption</a:t>
+            </a:r>
           </a:p>
         </p:txBody>
       </p:sp>
@@ -3528,6 +3560,567 @@
     <p:extLst>
       <p:ext uri="{BB962C8B-B14F-4D97-AF65-F5344CB8AC3E}">
         <p14:creationId xmlns:p14="http://schemas.microsoft.com/office/powerpoint/2010/main" val="3225556429"/>
+      </p:ext>
+    </p:extLst>
+  </p:cSld>
+  <p:clrMapOvr>
+    <a:masterClrMapping/>
+  </p:clrMapOvr>
+</p:sld>
+</file>
+
+<file path=ppt/slides/slide3.xml><?xml version="1.0" encoding="utf-8"?>
+<p:sld xmlns:a="http://schemas.openxmlformats.org/drawingml/2006/main" xmlns:r="http://schemas.openxmlformats.org/officeDocument/2006/relationships" xmlns:p="http://schemas.openxmlformats.org/presentationml/2006/main">
+  <p:cSld>
+    <p:spTree>
+      <p:nvGrpSpPr>
+        <p:cNvPr id="1" name=""/>
+        <p:cNvGrpSpPr/>
+        <p:nvPr/>
+      </p:nvGrpSpPr>
+      <p:grpSpPr>
+        <a:xfrm>
+          <a:off x="0" y="0"/>
+          <a:ext cx="0" cy="0"/>
+          <a:chOff x="0" y="0"/>
+          <a:chExt cx="0" cy="0"/>
+        </a:xfrm>
+      </p:grpSpPr>
+      <p:sp>
+        <p:nvSpPr>
+          <p:cNvPr id="2" name="Title 1">
+            <a:extLst>
+              <a:ext uri="{FF2B5EF4-FFF2-40B4-BE49-F238E27FC236}">
+                <a16:creationId xmlns:a16="http://schemas.microsoft.com/office/drawing/2014/main" id="{80DB7F08-038B-4BAD-9E3B-3120DC684E34}"/>
+              </a:ext>
+            </a:extLst>
+          </p:cNvPr>
+          <p:cNvSpPr>
+            <a:spLocks noGrp="1"/>
+          </p:cNvSpPr>
+          <p:nvPr>
+            <p:ph type="title"/>
+          </p:nvPr>
+        </p:nvSpPr>
+        <p:spPr/>
+        <p:txBody>
+          <a:bodyPr/>
+          <a:lstStyle/>
+          <a:p>
+            <a:r>
+              <a:rPr lang="en-US" dirty="0"/>
+              <a:t>Project overview</a:t>
+            </a:r>
+          </a:p>
+        </p:txBody>
+      </p:sp>
+      <p:sp>
+        <p:nvSpPr>
+          <p:cNvPr id="3" name="Content Placeholder 2">
+            <a:extLst>
+              <a:ext uri="{FF2B5EF4-FFF2-40B4-BE49-F238E27FC236}">
+                <a16:creationId xmlns:a16="http://schemas.microsoft.com/office/drawing/2014/main" id="{41A546AB-D24A-48E1-B904-DC30B5B87E9B}"/>
+              </a:ext>
+            </a:extLst>
+          </p:cNvPr>
+          <p:cNvSpPr>
+            <a:spLocks noGrp="1"/>
+          </p:cNvSpPr>
+          <p:nvPr>
+            <p:ph idx="1"/>
+          </p:nvPr>
+        </p:nvSpPr>
+        <p:spPr/>
+        <p:txBody>
+          <a:bodyPr/>
+          <a:lstStyle/>
+          <a:p>
+            <a:pPr marL="0" indent="0">
+              <a:buNone/>
+            </a:pPr>
+            <a:r>
+              <a:rPr lang="en-US" dirty="0"/>
+              <a:t>The following features have been implemented:</a:t>
+            </a:r>
+          </a:p>
+          <a:p>
+            <a:r>
+              <a:rPr lang="en-US" dirty="0"/>
+              <a:t>Signup / Login.</a:t>
+            </a:r>
+          </a:p>
+          <a:p>
+            <a:r>
+              <a:rPr lang="en-US" dirty="0"/>
+              <a:t>User credentials encryption.</a:t>
+            </a:r>
+          </a:p>
+          <a:p>
+            <a:r>
+              <a:rPr lang="en-US" dirty="0"/>
+              <a:t>Upload posts with thumbnail, private / public configuration, images, text message.</a:t>
+            </a:r>
+          </a:p>
+          <a:p>
+            <a:r>
+              <a:rPr lang="en-US" dirty="0"/>
+              <a:t>Search for friends by string keyword with the filtering.</a:t>
+            </a:r>
+          </a:p>
+          <a:p>
+            <a:r>
+              <a:rPr lang="en-US" dirty="0"/>
+              <a:t>View friend’s page.</a:t>
+            </a:r>
+          </a:p>
+          <a:p>
+            <a:r>
+              <a:rPr lang="en-US" dirty="0"/>
+              <a:t>View friend’s posts.</a:t>
+            </a:r>
+          </a:p>
+        </p:txBody>
+      </p:sp>
+    </p:spTree>
+    <p:extLst>
+      <p:ext uri="{BB962C8B-B14F-4D97-AF65-F5344CB8AC3E}">
+        <p14:creationId xmlns:p14="http://schemas.microsoft.com/office/powerpoint/2010/main" val="4040164178"/>
+      </p:ext>
+    </p:extLst>
+  </p:cSld>
+  <p:clrMapOvr>
+    <a:masterClrMapping/>
+  </p:clrMapOvr>
+</p:sld>
+</file>
+
+<file path=ppt/slides/slide4.xml><?xml version="1.0" encoding="utf-8"?>
+<p:sld xmlns:a="http://schemas.openxmlformats.org/drawingml/2006/main" xmlns:r="http://schemas.openxmlformats.org/officeDocument/2006/relationships" xmlns:p="http://schemas.openxmlformats.org/presentationml/2006/main">
+  <p:cSld>
+    <p:spTree>
+      <p:nvGrpSpPr>
+        <p:cNvPr id="1" name=""/>
+        <p:cNvGrpSpPr/>
+        <p:nvPr/>
+      </p:nvGrpSpPr>
+      <p:grpSpPr>
+        <a:xfrm>
+          <a:off x="0" y="0"/>
+          <a:ext cx="0" cy="0"/>
+          <a:chOff x="0" y="0"/>
+          <a:chExt cx="0" cy="0"/>
+        </a:xfrm>
+      </p:grpSpPr>
+      <p:sp>
+        <p:nvSpPr>
+          <p:cNvPr id="2" name="Title 1">
+            <a:extLst>
+              <a:ext uri="{FF2B5EF4-FFF2-40B4-BE49-F238E27FC236}">
+                <a16:creationId xmlns:a16="http://schemas.microsoft.com/office/drawing/2014/main" id="{80DB7F08-038B-4BAD-9E3B-3120DC684E34}"/>
+              </a:ext>
+            </a:extLst>
+          </p:cNvPr>
+          <p:cNvSpPr>
+            <a:spLocks noGrp="1"/>
+          </p:cNvSpPr>
+          <p:nvPr>
+            <p:ph type="title"/>
+          </p:nvPr>
+        </p:nvSpPr>
+        <p:spPr/>
+        <p:txBody>
+          <a:bodyPr/>
+          <a:lstStyle/>
+          <a:p>
+            <a:r>
+              <a:rPr lang="en-US" dirty="0"/>
+              <a:t>Project details</a:t>
+            </a:r>
+          </a:p>
+        </p:txBody>
+      </p:sp>
+      <p:sp>
+        <p:nvSpPr>
+          <p:cNvPr id="3" name="Content Placeholder 2">
+            <a:extLst>
+              <a:ext uri="{FF2B5EF4-FFF2-40B4-BE49-F238E27FC236}">
+                <a16:creationId xmlns:a16="http://schemas.microsoft.com/office/drawing/2014/main" id="{41A546AB-D24A-48E1-B904-DC30B5B87E9B}"/>
+              </a:ext>
+            </a:extLst>
+          </p:cNvPr>
+          <p:cNvSpPr>
+            <a:spLocks noGrp="1"/>
+          </p:cNvSpPr>
+          <p:nvPr>
+            <p:ph idx="1"/>
+          </p:nvPr>
+        </p:nvSpPr>
+        <p:spPr>
+          <a:xfrm>
+            <a:off x="838199" y="1354284"/>
+            <a:ext cx="10515600" cy="5273527"/>
+          </a:xfrm>
+        </p:spPr>
+        <p:txBody>
+          <a:bodyPr/>
+          <a:lstStyle/>
+          <a:p>
+            <a:pPr marL="0" indent="0">
+              <a:buNone/>
+            </a:pPr>
+            <a:r>
+              <a:rPr lang="en-US" dirty="0"/>
+              <a:t>The following diagram summarizes the relationships between the persisted data.</a:t>
+            </a:r>
+          </a:p>
+          <a:p>
+            <a:pPr marL="0" indent="0">
+              <a:buNone/>
+            </a:pPr>
+            <a:endParaRPr lang="en-US" dirty="0"/>
+          </a:p>
+          <a:p>
+            <a:pPr marL="0" indent="0">
+              <a:buNone/>
+            </a:pPr>
+            <a:endParaRPr lang="en-US" dirty="0"/>
+          </a:p>
+        </p:txBody>
+      </p:sp>
+      <p:pic>
+        <p:nvPicPr>
+          <p:cNvPr id="5" name="Picture 4" descr="A screenshot of a cell phone&#10;&#10;Description automatically generated">
+            <a:extLst>
+              <a:ext uri="{FF2B5EF4-FFF2-40B4-BE49-F238E27FC236}">
+                <a16:creationId xmlns:a16="http://schemas.microsoft.com/office/drawing/2014/main" id="{C766345F-6374-4C4E-9F5C-0FB5B15DCFBF}"/>
+              </a:ext>
+            </a:extLst>
+          </p:cNvPr>
+          <p:cNvPicPr>
+            <a:picLocks noChangeAspect="1"/>
+          </p:cNvPicPr>
+          <p:nvPr/>
+        </p:nvPicPr>
+        <p:blipFill>
+          <a:blip r:embed="rId2">
+            <a:extLst>
+              <a:ext uri="{28A0092B-C50C-407E-A947-70E740481C1C}">
+                <a14:useLocalDpi xmlns:a14="http://schemas.microsoft.com/office/drawing/2010/main" val="0"/>
+              </a:ext>
+            </a:extLst>
+          </a:blip>
+          <a:stretch>
+            <a:fillRect/>
+          </a:stretch>
+        </p:blipFill>
+        <p:spPr>
+          <a:xfrm>
+            <a:off x="3471862" y="2236787"/>
+            <a:ext cx="5248275" cy="4391025"/>
+          </a:xfrm>
+          <a:prstGeom prst="rect">
+            <a:avLst/>
+          </a:prstGeom>
+          <a:ln>
+            <a:solidFill>
+              <a:schemeClr val="tx1"/>
+            </a:solidFill>
+          </a:ln>
+        </p:spPr>
+      </p:pic>
+    </p:spTree>
+    <p:extLst>
+      <p:ext uri="{BB962C8B-B14F-4D97-AF65-F5344CB8AC3E}">
+        <p14:creationId xmlns:p14="http://schemas.microsoft.com/office/powerpoint/2010/main" val="1259385253"/>
+      </p:ext>
+    </p:extLst>
+  </p:cSld>
+  <p:clrMapOvr>
+    <a:masterClrMapping/>
+  </p:clrMapOvr>
+</p:sld>
+</file>
+
+<file path=ppt/slides/slide5.xml><?xml version="1.0" encoding="utf-8"?>
+<p:sld xmlns:a="http://schemas.openxmlformats.org/drawingml/2006/main" xmlns:r="http://schemas.openxmlformats.org/officeDocument/2006/relationships" xmlns:p="http://schemas.openxmlformats.org/presentationml/2006/main">
+  <p:cSld>
+    <p:spTree>
+      <p:nvGrpSpPr>
+        <p:cNvPr id="1" name=""/>
+        <p:cNvGrpSpPr/>
+        <p:nvPr/>
+      </p:nvGrpSpPr>
+      <p:grpSpPr>
+        <a:xfrm>
+          <a:off x="0" y="0"/>
+          <a:ext cx="0" cy="0"/>
+          <a:chOff x="0" y="0"/>
+          <a:chExt cx="0" cy="0"/>
+        </a:xfrm>
+      </p:grpSpPr>
+      <p:sp>
+        <p:nvSpPr>
+          <p:cNvPr id="2" name="Title 1">
+            <a:extLst>
+              <a:ext uri="{FF2B5EF4-FFF2-40B4-BE49-F238E27FC236}">
+                <a16:creationId xmlns:a16="http://schemas.microsoft.com/office/drawing/2014/main" id="{80DB7F08-038B-4BAD-9E3B-3120DC684E34}"/>
+              </a:ext>
+            </a:extLst>
+          </p:cNvPr>
+          <p:cNvSpPr>
+            <a:spLocks noGrp="1"/>
+          </p:cNvSpPr>
+          <p:nvPr>
+            <p:ph type="title"/>
+          </p:nvPr>
+        </p:nvSpPr>
+        <p:spPr/>
+        <p:txBody>
+          <a:bodyPr/>
+          <a:lstStyle/>
+          <a:p>
+            <a:r>
+              <a:rPr lang="en-US" dirty="0"/>
+              <a:t>Project details</a:t>
+            </a:r>
+          </a:p>
+        </p:txBody>
+      </p:sp>
+      <p:sp>
+        <p:nvSpPr>
+          <p:cNvPr id="3" name="Content Placeholder 2">
+            <a:extLst>
+              <a:ext uri="{FF2B5EF4-FFF2-40B4-BE49-F238E27FC236}">
+                <a16:creationId xmlns:a16="http://schemas.microsoft.com/office/drawing/2014/main" id="{41A546AB-D24A-48E1-B904-DC30B5B87E9B}"/>
+              </a:ext>
+            </a:extLst>
+          </p:cNvPr>
+          <p:cNvSpPr>
+            <a:spLocks noGrp="1"/>
+          </p:cNvSpPr>
+          <p:nvPr>
+            <p:ph idx="1"/>
+          </p:nvPr>
+        </p:nvSpPr>
+        <p:spPr>
+          <a:xfrm>
+            <a:off x="0" y="1354284"/>
+            <a:ext cx="11353799" cy="5273527"/>
+          </a:xfrm>
+        </p:spPr>
+        <p:txBody>
+          <a:bodyPr/>
+          <a:lstStyle/>
+          <a:p>
+            <a:pPr marL="0" indent="0">
+              <a:buNone/>
+            </a:pPr>
+            <a:r>
+              <a:rPr lang="en-US" dirty="0"/>
+              <a:t>The following diagram summarizes</a:t>
+            </a:r>
+          </a:p>
+          <a:p>
+            <a:pPr marL="0" indent="0">
+              <a:buNone/>
+            </a:pPr>
+            <a:r>
+              <a:rPr lang="en-US" dirty="0"/>
+              <a:t>the relationships between the MVC </a:t>
+            </a:r>
+          </a:p>
+          <a:p>
+            <a:pPr marL="0" indent="0">
+              <a:buNone/>
+            </a:pPr>
+            <a:r>
+              <a:rPr lang="en-US" dirty="0"/>
+              <a:t>components.</a:t>
+            </a:r>
+          </a:p>
+          <a:p>
+            <a:pPr marL="0" indent="0">
+              <a:buNone/>
+            </a:pPr>
+            <a:endParaRPr lang="en-US" dirty="0"/>
+          </a:p>
+          <a:p>
+            <a:pPr marL="0" indent="0">
+              <a:buNone/>
+            </a:pPr>
+            <a:endParaRPr lang="en-US" dirty="0"/>
+          </a:p>
+        </p:txBody>
+      </p:sp>
+      <p:pic>
+        <p:nvPicPr>
+          <p:cNvPr id="6" name="Picture 5" descr="A screenshot of a cell phone&#10;&#10;Description automatically generated">
+            <a:extLst>
+              <a:ext uri="{FF2B5EF4-FFF2-40B4-BE49-F238E27FC236}">
+                <a16:creationId xmlns:a16="http://schemas.microsoft.com/office/drawing/2014/main" id="{78065001-2864-44DE-B97F-0B3030EF5BE2}"/>
+              </a:ext>
+            </a:extLst>
+          </p:cNvPr>
+          <p:cNvPicPr>
+            <a:picLocks noChangeAspect="1"/>
+          </p:cNvPicPr>
+          <p:nvPr/>
+        </p:nvPicPr>
+        <p:blipFill>
+          <a:blip r:embed="rId2">
+            <a:extLst>
+              <a:ext uri="{28A0092B-C50C-407E-A947-70E740481C1C}">
+                <a14:useLocalDpi xmlns:a14="http://schemas.microsoft.com/office/drawing/2010/main" val="0"/>
+              </a:ext>
+            </a:extLst>
+          </a:blip>
+          <a:stretch>
+            <a:fillRect/>
+          </a:stretch>
+        </p:blipFill>
+        <p:spPr>
+          <a:xfrm>
+            <a:off x="5276850" y="866775"/>
+            <a:ext cx="6915150" cy="5991225"/>
+          </a:xfrm>
+          <a:prstGeom prst="rect">
+            <a:avLst/>
+          </a:prstGeom>
+          <a:ln>
+            <a:solidFill>
+              <a:schemeClr val="tx1"/>
+            </a:solidFill>
+          </a:ln>
+        </p:spPr>
+      </p:pic>
+    </p:spTree>
+    <p:extLst>
+      <p:ext uri="{BB962C8B-B14F-4D97-AF65-F5344CB8AC3E}">
+        <p14:creationId xmlns:p14="http://schemas.microsoft.com/office/powerpoint/2010/main" val="3095407638"/>
+      </p:ext>
+    </p:extLst>
+  </p:cSld>
+  <p:clrMapOvr>
+    <a:masterClrMapping/>
+  </p:clrMapOvr>
+</p:sld>
+</file>
+
+<file path=ppt/slides/slide6.xml><?xml version="1.0" encoding="utf-8"?>
+<p:sld xmlns:a="http://schemas.openxmlformats.org/drawingml/2006/main" xmlns:r="http://schemas.openxmlformats.org/officeDocument/2006/relationships" xmlns:p="http://schemas.openxmlformats.org/presentationml/2006/main">
+  <p:cSld>
+    <p:spTree>
+      <p:nvGrpSpPr>
+        <p:cNvPr id="1" name=""/>
+        <p:cNvGrpSpPr/>
+        <p:nvPr/>
+      </p:nvGrpSpPr>
+      <p:grpSpPr>
+        <a:xfrm>
+          <a:off x="0" y="0"/>
+          <a:ext cx="0" cy="0"/>
+          <a:chOff x="0" y="0"/>
+          <a:chExt cx="0" cy="0"/>
+        </a:xfrm>
+      </p:grpSpPr>
+      <p:sp>
+        <p:nvSpPr>
+          <p:cNvPr id="2" name="Title 1">
+            <a:extLst>
+              <a:ext uri="{FF2B5EF4-FFF2-40B4-BE49-F238E27FC236}">
+                <a16:creationId xmlns:a16="http://schemas.microsoft.com/office/drawing/2014/main" id="{794EC7F8-C574-4ED9-8D3F-9776AC531C95}"/>
+              </a:ext>
+            </a:extLst>
+          </p:cNvPr>
+          <p:cNvSpPr>
+            <a:spLocks noGrp="1"/>
+          </p:cNvSpPr>
+          <p:nvPr>
+            <p:ph type="title"/>
+          </p:nvPr>
+        </p:nvSpPr>
+        <p:spPr/>
+        <p:txBody>
+          <a:bodyPr/>
+          <a:lstStyle/>
+          <a:p>
+            <a:r>
+              <a:rPr lang="en-US" dirty="0"/>
+              <a:t>Project details</a:t>
+            </a:r>
+          </a:p>
+        </p:txBody>
+      </p:sp>
+      <p:sp>
+        <p:nvSpPr>
+          <p:cNvPr id="3" name="Content Placeholder 2">
+            <a:extLst>
+              <a:ext uri="{FF2B5EF4-FFF2-40B4-BE49-F238E27FC236}">
+                <a16:creationId xmlns:a16="http://schemas.microsoft.com/office/drawing/2014/main" id="{4D6B9780-2781-4F5A-8809-A456FC2C554D}"/>
+              </a:ext>
+            </a:extLst>
+          </p:cNvPr>
+          <p:cNvSpPr>
+            <a:spLocks noGrp="1"/>
+          </p:cNvSpPr>
+          <p:nvPr>
+            <p:ph idx="1"/>
+          </p:nvPr>
+        </p:nvSpPr>
+        <p:spPr/>
+        <p:txBody>
+          <a:bodyPr/>
+          <a:lstStyle/>
+          <a:p>
+            <a:pPr marL="0" indent="0">
+              <a:buNone/>
+            </a:pPr>
+            <a:r>
+              <a:rPr lang="en-US" dirty="0"/>
+              <a:t>To run the project, please consult the README.txt in the root directory</a:t>
+            </a:r>
+          </a:p>
+        </p:txBody>
+      </p:sp>
+      <p:pic>
+        <p:nvPicPr>
+          <p:cNvPr id="4" name="Picture 3">
+            <a:extLst>
+              <a:ext uri="{FF2B5EF4-FFF2-40B4-BE49-F238E27FC236}">
+                <a16:creationId xmlns:a16="http://schemas.microsoft.com/office/drawing/2014/main" id="{51EC34AE-1665-4CE0-921F-D24836C931C4}"/>
+              </a:ext>
+            </a:extLst>
+          </p:cNvPr>
+          <p:cNvPicPr>
+            <a:picLocks noChangeAspect="1"/>
+          </p:cNvPicPr>
+          <p:nvPr/>
+        </p:nvPicPr>
+        <p:blipFill>
+          <a:blip r:embed="rId2"/>
+          <a:stretch>
+            <a:fillRect/>
+          </a:stretch>
+        </p:blipFill>
+        <p:spPr>
+          <a:xfrm>
+            <a:off x="838200" y="2303556"/>
+            <a:ext cx="8635738" cy="4320248"/>
+          </a:xfrm>
+          <a:prstGeom prst="rect">
+            <a:avLst/>
+          </a:prstGeom>
+          <a:ln>
+            <a:solidFill>
+              <a:schemeClr val="tx1"/>
+            </a:solidFill>
+          </a:ln>
+        </p:spPr>
+      </p:pic>
+    </p:spTree>
+    <p:extLst>
+      <p:ext uri="{BB962C8B-B14F-4D97-AF65-F5344CB8AC3E}">
+        <p14:creationId xmlns:p14="http://schemas.microsoft.com/office/powerpoint/2010/main" val="2402080152"/>
       </p:ext>
     </p:extLst>
   </p:cSld>

</xml_diff>